<commit_message>
update module 7 for videos
</commit_message>
<xml_diff>
--- a/module_04/module4.pptx
+++ b/module_04/module4.pptx
@@ -260,7 +260,7 @@
           <a:p>
             <a:fld id="{D7DE5C0D-2F04-430D-8801-ECDC32FB7CA6}" type="datetimeFigureOut">
               <a:rPr lang="ru-RU" smtClean="0"/>
-              <a:t>29.06.2022</a:t>
+              <a:t>30.06.2022</a:t>
             </a:fld>
             <a:endParaRPr lang="ru-RU"/>
           </a:p>
@@ -430,7 +430,7 @@
           <a:p>
             <a:fld id="{D7DE5C0D-2F04-430D-8801-ECDC32FB7CA6}" type="datetimeFigureOut">
               <a:rPr lang="ru-RU" smtClean="0"/>
-              <a:t>29.06.2022</a:t>
+              <a:t>30.06.2022</a:t>
             </a:fld>
             <a:endParaRPr lang="ru-RU"/>
           </a:p>
@@ -610,7 +610,7 @@
           <a:p>
             <a:fld id="{D7DE5C0D-2F04-430D-8801-ECDC32FB7CA6}" type="datetimeFigureOut">
               <a:rPr lang="ru-RU" smtClean="0"/>
-              <a:t>29.06.2022</a:t>
+              <a:t>30.06.2022</a:t>
             </a:fld>
             <a:endParaRPr lang="ru-RU"/>
           </a:p>
@@ -780,7 +780,7 @@
           <a:p>
             <a:fld id="{D7DE5C0D-2F04-430D-8801-ECDC32FB7CA6}" type="datetimeFigureOut">
               <a:rPr lang="ru-RU" smtClean="0"/>
-              <a:t>29.06.2022</a:t>
+              <a:t>30.06.2022</a:t>
             </a:fld>
             <a:endParaRPr lang="ru-RU"/>
           </a:p>
@@ -1026,7 +1026,7 @@
           <a:p>
             <a:fld id="{D7DE5C0D-2F04-430D-8801-ECDC32FB7CA6}" type="datetimeFigureOut">
               <a:rPr lang="ru-RU" smtClean="0"/>
-              <a:t>29.06.2022</a:t>
+              <a:t>30.06.2022</a:t>
             </a:fld>
             <a:endParaRPr lang="ru-RU"/>
           </a:p>
@@ -1258,7 +1258,7 @@
           <a:p>
             <a:fld id="{D7DE5C0D-2F04-430D-8801-ECDC32FB7CA6}" type="datetimeFigureOut">
               <a:rPr lang="ru-RU" smtClean="0"/>
-              <a:t>29.06.2022</a:t>
+              <a:t>30.06.2022</a:t>
             </a:fld>
             <a:endParaRPr lang="ru-RU"/>
           </a:p>
@@ -1625,7 +1625,7 @@
           <a:p>
             <a:fld id="{D7DE5C0D-2F04-430D-8801-ECDC32FB7CA6}" type="datetimeFigureOut">
               <a:rPr lang="ru-RU" smtClean="0"/>
-              <a:t>29.06.2022</a:t>
+              <a:t>30.06.2022</a:t>
             </a:fld>
             <a:endParaRPr lang="ru-RU"/>
           </a:p>
@@ -1743,7 +1743,7 @@
           <a:p>
             <a:fld id="{D7DE5C0D-2F04-430D-8801-ECDC32FB7CA6}" type="datetimeFigureOut">
               <a:rPr lang="ru-RU" smtClean="0"/>
-              <a:t>29.06.2022</a:t>
+              <a:t>30.06.2022</a:t>
             </a:fld>
             <a:endParaRPr lang="ru-RU"/>
           </a:p>
@@ -1838,7 +1838,7 @@
           <a:p>
             <a:fld id="{D7DE5C0D-2F04-430D-8801-ECDC32FB7CA6}" type="datetimeFigureOut">
               <a:rPr lang="ru-RU" smtClean="0"/>
-              <a:t>29.06.2022</a:t>
+              <a:t>30.06.2022</a:t>
             </a:fld>
             <a:endParaRPr lang="ru-RU"/>
           </a:p>
@@ -2115,7 +2115,7 @@
           <a:p>
             <a:fld id="{D7DE5C0D-2F04-430D-8801-ECDC32FB7CA6}" type="datetimeFigureOut">
               <a:rPr lang="ru-RU" smtClean="0"/>
-              <a:t>29.06.2022</a:t>
+              <a:t>30.06.2022</a:t>
             </a:fld>
             <a:endParaRPr lang="ru-RU"/>
           </a:p>
@@ -2368,7 +2368,7 @@
           <a:p>
             <a:fld id="{D7DE5C0D-2F04-430D-8801-ECDC32FB7CA6}" type="datetimeFigureOut">
               <a:rPr lang="ru-RU" smtClean="0"/>
-              <a:t>29.06.2022</a:t>
+              <a:t>30.06.2022</a:t>
             </a:fld>
             <a:endParaRPr lang="ru-RU"/>
           </a:p>
@@ -2581,7 +2581,7 @@
           <a:p>
             <a:fld id="{D7DE5C0D-2F04-430D-8801-ECDC32FB7CA6}" type="datetimeFigureOut">
               <a:rPr lang="ru-RU" smtClean="0"/>
-              <a:t>29.06.2022</a:t>
+              <a:t>30.06.2022</a:t>
             </a:fld>
             <a:endParaRPr lang="ru-RU"/>
           </a:p>

</xml_diff>